<commit_message>
Nochmal meine slides verbessert
</commit_message>
<xml_diff>
--- a/Project Proposal.pptx
+++ b/Project Proposal.pptx
@@ -30366,42 +30366,9 @@
             <a:endParaRPr lang="de-DE" dirty="0"/>
           </a:p>
           <a:p>
-            <a:pPr lvl="1"/>
-            <a:r>
-              <a:rPr lang="de-DE" dirty="0" err="1"/>
-              <a:t>Normalize</a:t>
-            </a:r>
-            <a:r>
-              <a:rPr lang="de-DE" dirty="0"/>
-              <a:t> or </a:t>
-            </a:r>
-            <a:r>
-              <a:rPr lang="de-DE" dirty="0" err="1"/>
-              <a:t>scale</a:t>
-            </a:r>
-            <a:r>
-              <a:rPr lang="de-DE" dirty="0"/>
-              <a:t> </a:t>
-            </a:r>
-            <a:r>
-              <a:rPr lang="de-DE" dirty="0" err="1"/>
-              <a:t>data</a:t>
-            </a:r>
-            <a:r>
-              <a:rPr lang="de-DE" dirty="0"/>
-              <a:t> </a:t>
-            </a:r>
-            <a:r>
-              <a:rPr lang="de-DE" dirty="0" err="1"/>
-              <a:t>differently</a:t>
-            </a:r>
-            <a:r>
-              <a:rPr lang="de-DE" dirty="0"/>
-              <a:t> ?</a:t>
-            </a:r>
-          </a:p>
-          <a:p>
-            <a:pPr lvl="1"/>
+            <a:pPr marL="530352" lvl="1" indent="0">
+              <a:buNone/>
+            </a:pPr>
             <a:endParaRPr lang="de-DE" dirty="0"/>
           </a:p>
           <a:p>
@@ -30416,10 +30383,10 @@
       </p:sp>
       <p:pic>
         <p:nvPicPr>
-          <p:cNvPr id="4" name="Grafik 3">
+          <p:cNvPr id="5" name="Grafik 4">
             <a:extLst>
               <a:ext uri="{FF2B5EF4-FFF2-40B4-BE49-F238E27FC236}">
-                <a16:creationId xmlns:a16="http://schemas.microsoft.com/office/drawing/2014/main" id="{80CC5D00-C4B3-4C0A-A582-12C44880DF18}"/>
+                <a16:creationId xmlns:a16="http://schemas.microsoft.com/office/drawing/2014/main" id="{F53126FB-B72E-481E-9DFC-75BF6F1F49E8}"/>
               </a:ext>
             </a:extLst>
           </p:cNvPr>
@@ -30428,15 +30395,16 @@
           </p:cNvPicPr>
           <p:nvPr/>
         </p:nvPicPr>
-        <p:blipFill rotWithShape="1">
+        <p:blipFill>
           <a:blip r:embed="rId2"/>
-          <a:srcRect l="7513" r="20149"/>
-          <a:stretch/>
+          <a:stretch>
+            <a:fillRect/>
+          </a:stretch>
         </p:blipFill>
         <p:spPr>
           <a:xfrm>
-            <a:off x="5938684" y="2681317"/>
-            <a:ext cx="5919018" cy="1823710"/>
+            <a:off x="6686550" y="2854342"/>
+            <a:ext cx="4286250" cy="1323975"/>
           </a:xfrm>
           <a:prstGeom prst="rect">
             <a:avLst/>
@@ -30970,7 +30938,7 @@
                                           </p:stCondLst>
                                         </p:cTn>
                                         <p:tgtEl>
-                                          <p:spTgt spid="4"/>
+                                          <p:spTgt spid="21"/>
                                         </p:tgtEl>
                                         <p:attrNameLst>
                                           <p:attrName>style.visibility</p:attrName>

</xml_diff>

<commit_message>
typo + kommentare an future plans folie
</commit_message>
<xml_diff>
--- a/Project Proposal.pptx
+++ b/Project Proposal.pptx
@@ -127,6 +127,41 @@
     </p:ext>
   </p:extLst>
 </p:presentation>
+</file>
+
+<file path=ppt/commentAuthors.xml><?xml version="1.0" encoding="utf-8"?>
+<p:cmAuthorLst xmlns:a="http://schemas.openxmlformats.org/drawingml/2006/main" xmlns:r="http://schemas.openxmlformats.org/officeDocument/2006/relationships" xmlns:p="http://schemas.openxmlformats.org/presentationml/2006/main">
+  <p:cmAuthor id="1" name="Bastian Eichmüller" initials="BE" lastIdx="2" clrIdx="0">
+    <p:extLst>
+      <p:ext uri="{19B8F6BF-5375-455C-9EA6-DF929625EA0E}">
+        <p15:presenceInfo xmlns:p15="http://schemas.microsoft.com/office/powerpoint/2012/main" userId="f008cda6e74367f4" providerId="Windows Live"/>
+      </p:ext>
+    </p:extLst>
+  </p:cmAuthor>
+</p:cmAuthorLst>
+</file>
+
+<file path=ppt/comments/comment1.xml><?xml version="1.0" encoding="utf-8"?>
+<p:cmLst xmlns:a="http://schemas.openxmlformats.org/drawingml/2006/main" xmlns:r="http://schemas.openxmlformats.org/officeDocument/2006/relationships" xmlns:p="http://schemas.openxmlformats.org/presentationml/2006/main">
+  <p:cm authorId="1" dt="2019-05-13T17:39:53.862" idx="1">
+    <p:pos x="1434" y="952"/>
+    <p:text>+ our k-means should work in n dimensions</p:text>
+    <p:extLst>
+      <p:ext uri="{C676402C-5697-4E1C-873F-D02D1690AC5C}">
+        <p15:threadingInfo xmlns:p15="http://schemas.microsoft.com/office/powerpoint/2012/main" timeZoneBias="-120"/>
+      </p:ext>
+    </p:extLst>
+  </p:cm>
+  <p:cm authorId="1" dt="2019-05-13T17:40:53.462" idx="2">
+    <p:pos x="1702" y="966"/>
+    <p:text>+ logarithmisieren der matrix</p:text>
+    <p:extLst>
+      <p:ext uri="{C676402C-5697-4E1C-873F-D02D1690AC5C}">
+        <p15:threadingInfo xmlns:p15="http://schemas.microsoft.com/office/powerpoint/2012/main" timeZoneBias="-120"/>
+      </p:ext>
+    </p:extLst>
+  </p:cm>
+</p:cmLst>
 </file>
 
 <file path=ppt/diagrams/colors1.xml><?xml version="1.0" encoding="utf-8"?>
@@ -29300,7 +29335,7 @@
             </a:br>
             <a:r>
               <a:rPr lang="de-DE" dirty="0"/>
-              <a:t>Juni</a:t>
+              <a:t>June</a:t>
             </a:r>
             <a:br>
               <a:rPr lang="de-DE" dirty="0"/>

</xml_diff>

<commit_message>
alle folien mit gemeinsamen updates
</commit_message>
<xml_diff>
--- a/Project Proposal.pptx
+++ b/Project Proposal.pptx
@@ -12,13 +12,13 @@
     <p:sldId id="257" r:id="rId3"/>
     <p:sldId id="260" r:id="rId4"/>
     <p:sldId id="263" r:id="rId5"/>
-    <p:sldId id="262" r:id="rId6"/>
-    <p:sldId id="268" r:id="rId7"/>
-    <p:sldId id="259" r:id="rId8"/>
-    <p:sldId id="258" r:id="rId9"/>
-    <p:sldId id="261" r:id="rId10"/>
-    <p:sldId id="264" r:id="rId11"/>
-    <p:sldId id="265" r:id="rId12"/>
+    <p:sldId id="268" r:id="rId6"/>
+    <p:sldId id="259" r:id="rId7"/>
+    <p:sldId id="258" r:id="rId8"/>
+    <p:sldId id="261" r:id="rId9"/>
+    <p:sldId id="264" r:id="rId10"/>
+    <p:sldId id="265" r:id="rId11"/>
+    <p:sldId id="272" r:id="rId12"/>
     <p:sldId id="269" r:id="rId13"/>
     <p:sldId id="270" r:id="rId14"/>
     <p:sldId id="266" r:id="rId15"/>
@@ -7087,7 +7087,7 @@
       <dgm:spPr/>
     </dgm:pt>
     <dgm:pt modelId="{1F3526C0-F05E-417F-85BE-BE17C3DBE7F0}" type="pres">
-      <dgm:prSet presAssocID="{3E5A51D5-80C3-4C0A-B034-4C9387C12780}" presName="childTextBox" presStyleLbl="fgAccFollowNode1" presStyleIdx="1" presStyleCnt="8">
+      <dgm:prSet presAssocID="{3E5A51D5-80C3-4C0A-B034-4C9387C12780}" presName="childTextBox" presStyleLbl="fgAccFollowNode1" presStyleIdx="1" presStyleCnt="8" custLinFactNeighborY="1005">
         <dgm:presLayoutVars>
           <dgm:bulletEnabled val="1"/>
         </dgm:presLayoutVars>
@@ -9928,7 +9928,7 @@
       </dsp:nvSpPr>
       <dsp:spPr>
         <a:xfrm>
-          <a:off x="4800600" y="4414839"/>
+          <a:off x="4800600" y="4418848"/>
           <a:ext cx="4800600" cy="398913"/>
         </a:xfrm>
         <a:prstGeom prst="rect">
@@ -9996,7 +9996,7 @@
         </a:p>
       </dsp:txBody>
       <dsp:txXfrm>
-        <a:off x="4800600" y="4414839"/>
+        <a:off x="4800600" y="4418848"/>
         <a:ext cx="4800600" cy="398913"/>
       </dsp:txXfrm>
     </dsp:sp>
@@ -23738,7 +23738,7 @@
           <a:p>
             <a:fld id="{E7E59A38-91BB-4C93-A3BD-B3DAC61A8C6D}" type="datetimeFigureOut">
               <a:rPr lang="de-DE" smtClean="0"/>
-              <a:t>13.05.2019</a:t>
+              <a:t>14.05.2019</a:t>
             </a:fld>
             <a:endParaRPr lang="de-DE"/>
           </a:p>
@@ -24258,7 +24258,7 @@
           <a:p>
             <a:fld id="{4AAD347D-5ACD-4C99-B74B-A9C85AD731AF}" type="datetimeFigureOut">
               <a:rPr lang="en-US" smtClean="0"/>
-              <a:t>5/13/2019</a:t>
+              <a:t>5/14/2019</a:t>
             </a:fld>
             <a:endParaRPr lang="en-US" dirty="0"/>
           </a:p>
@@ -24588,7 +24588,7 @@
           <a:p>
             <a:fld id="{4509A250-FF31-4206-8172-F9D3106AACB1}" type="datetimeFigureOut">
               <a:rPr lang="en-US" smtClean="0"/>
-              <a:t>5/13/2019</a:t>
+              <a:t>5/14/2019</a:t>
             </a:fld>
             <a:endParaRPr lang="en-US" dirty="0"/>
           </a:p>
@@ -24768,7 +24768,7 @@
           <a:p>
             <a:fld id="{4509A250-FF31-4206-8172-F9D3106AACB1}" type="datetimeFigureOut">
               <a:rPr lang="en-US" smtClean="0"/>
-              <a:t>5/13/2019</a:t>
+              <a:t>5/14/2019</a:t>
             </a:fld>
             <a:endParaRPr lang="en-US" dirty="0"/>
           </a:p>
@@ -24938,7 +24938,7 @@
           <a:p>
             <a:fld id="{4509A250-FF31-4206-8172-F9D3106AACB1}" type="datetimeFigureOut">
               <a:rPr lang="en-US" smtClean="0"/>
-              <a:t>5/13/2019</a:t>
+              <a:t>5/14/2019</a:t>
             </a:fld>
             <a:endParaRPr lang="en-US" dirty="0"/>
           </a:p>
@@ -25215,7 +25215,7 @@
           <a:p>
             <a:fld id="{9796027F-7875-4030-9381-8BD8C4F21935}" type="datetimeFigureOut">
               <a:rPr lang="en-US" smtClean="0"/>
-              <a:t>5/13/2019</a:t>
+              <a:t>5/14/2019</a:t>
             </a:fld>
             <a:endParaRPr lang="en-US" dirty="0"/>
           </a:p>
@@ -25609,7 +25609,7 @@
           <a:p>
             <a:fld id="{9796027F-7875-4030-9381-8BD8C4F21935}" type="datetimeFigureOut">
               <a:rPr lang="en-US" smtClean="0"/>
-              <a:t>5/13/2019</a:t>
+              <a:t>5/14/2019</a:t>
             </a:fld>
             <a:endParaRPr lang="en-US" dirty="0"/>
           </a:p>
@@ -26086,7 +26086,7 @@
           <a:p>
             <a:fld id="{9796027F-7875-4030-9381-8BD8C4F21935}" type="datetimeFigureOut">
               <a:rPr lang="en-US" smtClean="0"/>
-              <a:t>5/13/2019</a:t>
+              <a:t>5/14/2019</a:t>
             </a:fld>
             <a:endParaRPr lang="en-US" dirty="0"/>
           </a:p>
@@ -26204,7 +26204,7 @@
           <a:p>
             <a:fld id="{4509A250-FF31-4206-8172-F9D3106AACB1}" type="datetimeFigureOut">
               <a:rPr lang="en-US" smtClean="0"/>
-              <a:t>5/13/2019</a:t>
+              <a:t>5/14/2019</a:t>
             </a:fld>
             <a:endParaRPr lang="en-US" dirty="0"/>
           </a:p>
@@ -26299,7 +26299,7 @@
           <a:p>
             <a:fld id="{4509A250-FF31-4206-8172-F9D3106AACB1}" type="datetimeFigureOut">
               <a:rPr lang="en-US" smtClean="0"/>
-              <a:t>5/13/2019</a:t>
+              <a:t>5/14/2019</a:t>
             </a:fld>
             <a:endParaRPr lang="en-US" dirty="0"/>
           </a:p>
@@ -26645,7 +26645,7 @@
           <a:p>
             <a:fld id="{4509A250-FF31-4206-8172-F9D3106AACB1}" type="datetimeFigureOut">
               <a:rPr lang="en-US" smtClean="0"/>
-              <a:t>5/13/2019</a:t>
+              <a:t>5/14/2019</a:t>
             </a:fld>
             <a:endParaRPr lang="en-US" dirty="0"/>
           </a:p>
@@ -27033,7 +27033,7 @@
           <a:p>
             <a:fld id="{4509A250-FF31-4206-8172-F9D3106AACB1}" type="datetimeFigureOut">
               <a:rPr lang="en-US" smtClean="0"/>
-              <a:t>5/13/2019</a:t>
+              <a:t>5/14/2019</a:t>
             </a:fld>
             <a:endParaRPr lang="en-US" dirty="0"/>
           </a:p>
@@ -27311,7 +27311,7 @@
           <a:p>
             <a:fld id="{4AAD347D-5ACD-4C99-B74B-A9C85AD731AF}" type="datetimeFigureOut">
               <a:rPr lang="en-US" smtClean="0"/>
-              <a:t>5/13/2019</a:t>
+              <a:t>5/14/2019</a:t>
             </a:fld>
             <a:endParaRPr lang="en-US" dirty="0"/>
           </a:p>
@@ -27832,36 +27832,6 @@
           <a:chExt cx="0" cy="0"/>
         </a:xfrm>
       </p:grpSpPr>
-      <p:pic>
-        <p:nvPicPr>
-          <p:cNvPr id="6" name="Grafik 5">
-            <a:extLst>
-              <a:ext uri="{FF2B5EF4-FFF2-40B4-BE49-F238E27FC236}">
-                <a16:creationId xmlns:a16="http://schemas.microsoft.com/office/drawing/2014/main" id="{163D5152-CF7D-4470-8F43-2741A8C04446}"/>
-              </a:ext>
-            </a:extLst>
-          </p:cNvPr>
-          <p:cNvPicPr>
-            <a:picLocks noChangeAspect="1"/>
-          </p:cNvPicPr>
-          <p:nvPr/>
-        </p:nvPicPr>
-        <p:blipFill>
-          <a:blip r:embed="rId2"/>
-          <a:stretch>
-            <a:fillRect/>
-          </a:stretch>
-        </p:blipFill>
-        <p:spPr>
-          <a:xfrm>
-            <a:off x="634275" y="901735"/>
-            <a:ext cx="6900380" cy="5054529"/>
-          </a:xfrm>
-          <a:prstGeom prst="rect">
-            <a:avLst/>
-          </a:prstGeom>
-        </p:spPr>
-      </p:pic>
       <p:sp>
         <p:nvSpPr>
           <p:cNvPr id="2" name="Titel 1">
@@ -27892,36 +27862,8 @@
           <a:p>
             <a:pPr algn="l"/>
             <a:r>
-              <a:rPr lang="de-DE" sz="4100" dirty="0"/>
-              <a:t>K-</a:t>
-            </a:r>
-            <a:r>
-              <a:rPr lang="de-DE" sz="4100" dirty="0" err="1"/>
-              <a:t>means</a:t>
-            </a:r>
-            <a:r>
-              <a:rPr lang="de-DE" sz="4100" dirty="0"/>
-              <a:t> </a:t>
-            </a:r>
-            <a:r>
-              <a:rPr lang="de-DE" sz="4100" dirty="0" err="1"/>
-              <a:t>clustering</a:t>
-            </a:r>
-            <a:r>
-              <a:rPr lang="de-DE" sz="4100" dirty="0"/>
-              <a:t> </a:t>
-            </a:r>
-            <a:r>
-              <a:rPr lang="de-DE" sz="4100" dirty="0" err="1"/>
-              <a:t>project</a:t>
-            </a:r>
-            <a:r>
-              <a:rPr lang="de-DE" sz="4100" dirty="0"/>
-              <a:t> </a:t>
-            </a:r>
-            <a:r>
-              <a:rPr lang="de-DE" sz="4100" dirty="0" err="1"/>
-              <a:t>proposal</a:t>
+              <a:rPr lang="de-DE" sz="4100"/>
+              <a:t>K-means clustering project proposal</a:t>
             </a:r>
             <a:endParaRPr lang="de-DE" sz="4100" dirty="0"/>
           </a:p>
@@ -27971,6 +27913,35 @@
           </a:p>
         </p:txBody>
       </p:sp>
+      <p:pic>
+        <p:nvPicPr>
+          <p:cNvPr id="5" name="Grafik 4">
+            <a:extLst>
+              <a:ext uri="{FF2B5EF4-FFF2-40B4-BE49-F238E27FC236}">
+                <a16:creationId xmlns:a16="http://schemas.microsoft.com/office/drawing/2014/main" id="{8D179E43-D436-4D50-8F8C-8BFD1548BDF3}"/>
+              </a:ext>
+            </a:extLst>
+          </p:cNvPr>
+          <p:cNvPicPr>
+            <a:picLocks noChangeAspect="1"/>
+          </p:cNvPicPr>
+          <p:nvPr/>
+        </p:nvPicPr>
+        <p:blipFill rotWithShape="1">
+          <a:blip r:embed="rId2"/>
+          <a:srcRect t="-1" b="2236"/>
+          <a:stretch/>
+        </p:blipFill>
+        <p:spPr>
+          <a:xfrm>
+            <a:off x="1372764" y="1314922"/>
+            <a:ext cx="6206765" cy="4392704"/>
+          </a:xfrm>
+          <a:prstGeom prst="rect">
+            <a:avLst/>
+          </a:prstGeom>
+        </p:spPr>
+      </p:pic>
     </p:spTree>
     <p:extLst>
       <p:ext uri="{BB962C8B-B14F-4D97-AF65-F5344CB8AC3E}">
@@ -27985,95 +27956,6 @@
 </file>
 
 <file path=ppt/slides/slide10.xml><?xml version="1.0" encoding="utf-8"?>
-<p:sld xmlns:a="http://schemas.openxmlformats.org/drawingml/2006/main" xmlns:r="http://schemas.openxmlformats.org/officeDocument/2006/relationships" xmlns:p="http://schemas.openxmlformats.org/presentationml/2006/main">
-  <p:cSld>
-    <p:spTree>
-      <p:nvGrpSpPr>
-        <p:cNvPr id="1" name=""/>
-        <p:cNvGrpSpPr/>
-        <p:nvPr/>
-      </p:nvGrpSpPr>
-      <p:grpSpPr>
-        <a:xfrm>
-          <a:off x="0" y="0"/>
-          <a:ext cx="0" cy="0"/>
-          <a:chOff x="0" y="0"/>
-          <a:chExt cx="0" cy="0"/>
-        </a:xfrm>
-      </p:grpSpPr>
-      <p:sp>
-        <p:nvSpPr>
-          <p:cNvPr id="2" name="Titel 1">
-            <a:extLst>
-              <a:ext uri="{FF2B5EF4-FFF2-40B4-BE49-F238E27FC236}">
-                <a16:creationId xmlns:a16="http://schemas.microsoft.com/office/drawing/2014/main" id="{568F2C59-1472-497B-9097-00D0F5DCA36F}"/>
-              </a:ext>
-            </a:extLst>
-          </p:cNvPr>
-          <p:cNvSpPr>
-            <a:spLocks noGrp="1"/>
-          </p:cNvSpPr>
-          <p:nvPr>
-            <p:ph type="title"/>
-          </p:nvPr>
-        </p:nvSpPr>
-        <p:spPr/>
-        <p:txBody>
-          <a:bodyPr/>
-          <a:lstStyle/>
-          <a:p>
-            <a:r>
-              <a:rPr lang="de-DE" dirty="0"/>
-              <a:t>Progress and </a:t>
-            </a:r>
-            <a:r>
-              <a:rPr lang="de-DE" dirty="0" err="1"/>
-              <a:t>results</a:t>
-            </a:r>
-            <a:endParaRPr lang="en-DE" dirty="0"/>
-          </a:p>
-        </p:txBody>
-      </p:sp>
-      <p:graphicFrame>
-        <p:nvGraphicFramePr>
-          <p:cNvPr id="9" name="Inhaltsplatzhalter 8">
-            <a:extLst>
-              <a:ext uri="{FF2B5EF4-FFF2-40B4-BE49-F238E27FC236}">
-                <a16:creationId xmlns:a16="http://schemas.microsoft.com/office/drawing/2014/main" id="{16C41FA3-7AAB-4273-8481-B68DB56A597A}"/>
-              </a:ext>
-            </a:extLst>
-          </p:cNvPr>
-          <p:cNvGraphicFramePr>
-            <a:graphicFrameLocks noGrp="1"/>
-          </p:cNvGraphicFramePr>
-          <p:nvPr>
-            <p:ph idx="1"/>
-          </p:nvPr>
-        </p:nvGraphicFramePr>
-        <p:xfrm>
-          <a:off x="1371600" y="2286000"/>
-          <a:ext cx="9601200" cy="3581400"/>
-        </p:xfrm>
-        <a:graphic>
-          <a:graphicData uri="http://schemas.openxmlformats.org/drawingml/2006/diagram">
-            <dgm:relIds xmlns:dgm="http://schemas.openxmlformats.org/drawingml/2006/diagram" xmlns:r="http://schemas.openxmlformats.org/officeDocument/2006/relationships" r:dm="rId2" r:lo="rId3" r:qs="rId4" r:cs="rId5"/>
-          </a:graphicData>
-        </a:graphic>
-      </p:graphicFrame>
-    </p:spTree>
-    <p:extLst>
-      <p:ext uri="{BB962C8B-B14F-4D97-AF65-F5344CB8AC3E}">
-        <p14:creationId xmlns:p14="http://schemas.microsoft.com/office/powerpoint/2010/main" val="3695933313"/>
-      </p:ext>
-    </p:extLst>
-  </p:cSld>
-  <p:clrMapOvr>
-    <a:masterClrMapping/>
-  </p:clrMapOvr>
-</p:sld>
-</file>
-
-<file path=ppt/slides/slide11.xml><?xml version="1.0" encoding="utf-8"?>
 <p:sld xmlns:a="http://schemas.openxmlformats.org/drawingml/2006/main" xmlns:r="http://schemas.openxmlformats.org/officeDocument/2006/relationships" xmlns:p="http://schemas.openxmlformats.org/presentationml/2006/main">
   <p:cSld>
     <p:spTree>
@@ -28742,6 +28624,482 @@
       <p:bldP spid="5" grpId="0" animBg="1"/>
     </p:bldLst>
   </p:timing>
+</p:sld>
+</file>
+
+<file path=ppt/slides/slide11.xml><?xml version="1.0" encoding="utf-8"?>
+<p:sld xmlns:a="http://schemas.openxmlformats.org/drawingml/2006/main" xmlns:r="http://schemas.openxmlformats.org/officeDocument/2006/relationships" xmlns:p="http://schemas.openxmlformats.org/presentationml/2006/main">
+  <p:cSld>
+    <p:bg>
+      <p:bgPr>
+        <a:solidFill>
+          <a:schemeClr val="bg1"/>
+        </a:solidFill>
+        <a:effectLst/>
+      </p:bgPr>
+    </p:bg>
+    <p:spTree>
+      <p:nvGrpSpPr>
+        <p:cNvPr id="1" name=""/>
+        <p:cNvGrpSpPr/>
+        <p:nvPr/>
+      </p:nvGrpSpPr>
+      <p:grpSpPr>
+        <a:xfrm>
+          <a:off x="0" y="0"/>
+          <a:ext cx="0" cy="0"/>
+          <a:chOff x="0" y="0"/>
+          <a:chExt cx="0" cy="0"/>
+        </a:xfrm>
+      </p:grpSpPr>
+      <p:sp>
+        <p:nvSpPr>
+          <p:cNvPr id="12" name="Rectangle 11">
+            <a:extLst>
+              <a:ext uri="{FF2B5EF4-FFF2-40B4-BE49-F238E27FC236}">
+                <a16:creationId xmlns:a16="http://schemas.microsoft.com/office/drawing/2014/main" id="{12E8CD4E-6381-4807-AA5B-CE0024A8BE19}"/>
+              </a:ext>
+              <a:ext uri="{C183D7F6-B498-43B3-948B-1728B52AA6E4}">
+                <adec:decorative xmlns:adec="http://schemas.microsoft.com/office/drawing/2017/decorative" val="1"/>
+              </a:ext>
+            </a:extLst>
+          </p:cNvPr>
+          <p:cNvSpPr>
+            <a:spLocks noGrp="1" noRot="1" noChangeAspect="1" noMove="1" noResize="1" noEditPoints="1" noAdjustHandles="1" noChangeArrowheads="1" noChangeShapeType="1" noTextEdit="1"/>
+          </p:cNvSpPr>
+          <p:nvPr>
+            <p:extLst>
+              <p:ext uri="{386F3935-93C4-4BCD-93E2-E3B085C9AB24}">
+                <p16:designElem xmlns:p16="http://schemas.microsoft.com/office/powerpoint/2015/main" val="1"/>
+              </p:ext>
+            </p:extLst>
+          </p:nvPr>
+        </p:nvSpPr>
+        <p:spPr>
+          <a:xfrm>
+            <a:off x="0" y="0"/>
+            <a:ext cx="12192000" cy="6858000"/>
+          </a:xfrm>
+          <a:prstGeom prst="rect">
+            <a:avLst/>
+          </a:prstGeom>
+          <a:solidFill>
+            <a:schemeClr val="bg1">
+              <a:lumMod val="85000"/>
+              <a:lumOff val="15000"/>
+            </a:schemeClr>
+          </a:solidFill>
+          <a:ln>
+            <a:noFill/>
+          </a:ln>
+        </p:spPr>
+        <p:style>
+          <a:lnRef idx="2">
+            <a:schemeClr val="accent1">
+              <a:shade val="50000"/>
+            </a:schemeClr>
+          </a:lnRef>
+          <a:fillRef idx="1">
+            <a:schemeClr val="accent1"/>
+          </a:fillRef>
+          <a:effectRef idx="0">
+            <a:schemeClr val="accent1"/>
+          </a:effectRef>
+          <a:fontRef idx="minor">
+            <a:schemeClr val="lt1"/>
+          </a:fontRef>
+        </p:style>
+        <p:txBody>
+          <a:bodyPr rtlCol="0" anchor="ctr"/>
+          <a:lstStyle/>
+          <a:p>
+            <a:pPr algn="ctr"/>
+            <a:endParaRPr lang="en-US"/>
+          </a:p>
+        </p:txBody>
+      </p:sp>
+      <p:sp>
+        <p:nvSpPr>
+          <p:cNvPr id="14" name="Rectangle 13">
+            <a:extLst>
+              <a:ext uri="{FF2B5EF4-FFF2-40B4-BE49-F238E27FC236}">
+                <a16:creationId xmlns:a16="http://schemas.microsoft.com/office/drawing/2014/main" id="{D28445F8-F032-43C9-8D0F-A5155F525283}"/>
+              </a:ext>
+              <a:ext uri="{C183D7F6-B498-43B3-948B-1728B52AA6E4}">
+                <adec:decorative xmlns:adec="http://schemas.microsoft.com/office/drawing/2017/decorative" val="1"/>
+              </a:ext>
+            </a:extLst>
+          </p:cNvPr>
+          <p:cNvSpPr>
+            <a:spLocks noGrp="1" noRot="1" noChangeAspect="1" noMove="1" noResize="1" noEditPoints="1" noAdjustHandles="1" noChangeArrowheads="1" noChangeShapeType="1" noTextEdit="1"/>
+          </p:cNvSpPr>
+          <p:nvPr>
+            <p:extLst>
+              <p:ext uri="{386F3935-93C4-4BCD-93E2-E3B085C9AB24}">
+                <p16:designElem xmlns:p16="http://schemas.microsoft.com/office/powerpoint/2015/main" val="1"/>
+              </p:ext>
+            </p:extLst>
+          </p:nvPr>
+        </p:nvSpPr>
+        <p:spPr>
+          <a:xfrm>
+            <a:off x="477012" y="480059"/>
+            <a:ext cx="5538555" cy="2887029"/>
+          </a:xfrm>
+          <a:prstGeom prst="rect">
+            <a:avLst/>
+          </a:prstGeom>
+          <a:noFill/>
+          <a:ln>
+            <a:solidFill>
+              <a:schemeClr val="tx1"/>
+            </a:solidFill>
+          </a:ln>
+        </p:spPr>
+        <p:style>
+          <a:lnRef idx="2">
+            <a:schemeClr val="accent1">
+              <a:shade val="50000"/>
+            </a:schemeClr>
+          </a:lnRef>
+          <a:fillRef idx="1">
+            <a:schemeClr val="accent1"/>
+          </a:fillRef>
+          <a:effectRef idx="0">
+            <a:schemeClr val="accent1"/>
+          </a:effectRef>
+          <a:fontRef idx="minor">
+            <a:schemeClr val="lt1"/>
+          </a:fontRef>
+        </p:style>
+        <p:txBody>
+          <a:bodyPr rtlCol="0" anchor="ctr"/>
+          <a:lstStyle/>
+          <a:p>
+            <a:pPr algn="ctr"/>
+            <a:endParaRPr lang="en-US"/>
+          </a:p>
+        </p:txBody>
+      </p:sp>
+      <p:pic>
+        <p:nvPicPr>
+          <p:cNvPr id="5" name="Grafik 4">
+            <a:extLst>
+              <a:ext uri="{FF2B5EF4-FFF2-40B4-BE49-F238E27FC236}">
+                <a16:creationId xmlns:a16="http://schemas.microsoft.com/office/drawing/2014/main" id="{E3A88128-6E62-4F98-90A6-D13C8BCC9F9E}"/>
+              </a:ext>
+            </a:extLst>
+          </p:cNvPr>
+          <p:cNvPicPr>
+            <a:picLocks noChangeAspect="1"/>
+          </p:cNvPicPr>
+          <p:nvPr/>
+        </p:nvPicPr>
+        <p:blipFill>
+          <a:blip r:embed="rId2"/>
+          <a:stretch>
+            <a:fillRect/>
+          </a:stretch>
+        </p:blipFill>
+        <p:spPr>
+          <a:xfrm>
+            <a:off x="2103746" y="3672787"/>
+            <a:ext cx="2285085" cy="2560320"/>
+          </a:xfrm>
+          <a:prstGeom prst="rect">
+            <a:avLst/>
+          </a:prstGeom>
+        </p:spPr>
+      </p:pic>
+      <p:sp>
+        <p:nvSpPr>
+          <p:cNvPr id="16" name="Rectangle 15">
+            <a:extLst>
+              <a:ext uri="{FF2B5EF4-FFF2-40B4-BE49-F238E27FC236}">
+                <a16:creationId xmlns:a16="http://schemas.microsoft.com/office/drawing/2014/main" id="{36A325B5-56A3-425A-B9A3-0CEB7CA1BBF6}"/>
+              </a:ext>
+              <a:ext uri="{C183D7F6-B498-43B3-948B-1728B52AA6E4}">
+                <adec:decorative xmlns:adec="http://schemas.microsoft.com/office/drawing/2017/decorative" val="1"/>
+              </a:ext>
+            </a:extLst>
+          </p:cNvPr>
+          <p:cNvSpPr>
+            <a:spLocks noGrp="1" noRot="1" noChangeAspect="1" noMove="1" noResize="1" noEditPoints="1" noAdjustHandles="1" noChangeArrowheads="1" noChangeShapeType="1" noTextEdit="1"/>
+          </p:cNvSpPr>
+          <p:nvPr>
+            <p:extLst>
+              <p:ext uri="{386F3935-93C4-4BCD-93E2-E3B085C9AB24}">
+                <p16:designElem xmlns:p16="http://schemas.microsoft.com/office/powerpoint/2015/main" val="1"/>
+              </p:ext>
+            </p:extLst>
+          </p:nvPr>
+        </p:nvSpPr>
+        <p:spPr>
+          <a:xfrm>
+            <a:off x="6176432" y="480060"/>
+            <a:ext cx="5538555" cy="2887028"/>
+          </a:xfrm>
+          <a:prstGeom prst="rect">
+            <a:avLst/>
+          </a:prstGeom>
+          <a:noFill/>
+          <a:ln>
+            <a:solidFill>
+              <a:schemeClr val="tx1"/>
+            </a:solidFill>
+          </a:ln>
+        </p:spPr>
+        <p:style>
+          <a:lnRef idx="2">
+            <a:schemeClr val="accent1">
+              <a:shade val="50000"/>
+            </a:schemeClr>
+          </a:lnRef>
+          <a:fillRef idx="1">
+            <a:schemeClr val="accent1"/>
+          </a:fillRef>
+          <a:effectRef idx="0">
+            <a:schemeClr val="accent1"/>
+          </a:effectRef>
+          <a:fontRef idx="minor">
+            <a:schemeClr val="lt1"/>
+          </a:fontRef>
+        </p:style>
+        <p:txBody>
+          <a:bodyPr rtlCol="0" anchor="ctr"/>
+          <a:lstStyle/>
+          <a:p>
+            <a:pPr algn="ctr"/>
+            <a:endParaRPr lang="en-US"/>
+          </a:p>
+        </p:txBody>
+      </p:sp>
+      <p:pic>
+        <p:nvPicPr>
+          <p:cNvPr id="6" name="Grafik 5">
+            <a:extLst>
+              <a:ext uri="{FF2B5EF4-FFF2-40B4-BE49-F238E27FC236}">
+                <a16:creationId xmlns:a16="http://schemas.microsoft.com/office/drawing/2014/main" id="{876BB8D0-FA6D-4CA2-8990-DA294569FDB7}"/>
+              </a:ext>
+            </a:extLst>
+          </p:cNvPr>
+          <p:cNvPicPr>
+            <a:picLocks noChangeAspect="1"/>
+          </p:cNvPicPr>
+          <p:nvPr/>
+        </p:nvPicPr>
+        <p:blipFill>
+          <a:blip r:embed="rId3"/>
+          <a:stretch>
+            <a:fillRect/>
+          </a:stretch>
+        </p:blipFill>
+        <p:spPr>
+          <a:xfrm>
+            <a:off x="6459961" y="644229"/>
+            <a:ext cx="4971495" cy="2560320"/>
+          </a:xfrm>
+          <a:prstGeom prst="rect">
+            <a:avLst/>
+          </a:prstGeom>
+        </p:spPr>
+      </p:pic>
+      <p:sp>
+        <p:nvSpPr>
+          <p:cNvPr id="18" name="Rectangle 17">
+            <a:extLst>
+              <a:ext uri="{FF2B5EF4-FFF2-40B4-BE49-F238E27FC236}">
+                <a16:creationId xmlns:a16="http://schemas.microsoft.com/office/drawing/2014/main" id="{B80DE958-9D45-4CAD-BF1F-FA2ED970B7F6}"/>
+              </a:ext>
+              <a:ext uri="{C183D7F6-B498-43B3-948B-1728B52AA6E4}">
+                <adec:decorative xmlns:adec="http://schemas.microsoft.com/office/drawing/2017/decorative" val="1"/>
+              </a:ext>
+            </a:extLst>
+          </p:cNvPr>
+          <p:cNvSpPr>
+            <a:spLocks noGrp="1" noRot="1" noChangeAspect="1" noMove="1" noResize="1" noEditPoints="1" noAdjustHandles="1" noChangeArrowheads="1" noChangeShapeType="1" noTextEdit="1"/>
+          </p:cNvSpPr>
+          <p:nvPr>
+            <p:extLst>
+              <p:ext uri="{386F3935-93C4-4BCD-93E2-E3B085C9AB24}">
+                <p16:designElem xmlns:p16="http://schemas.microsoft.com/office/powerpoint/2015/main" val="1"/>
+              </p:ext>
+            </p:extLst>
+          </p:nvPr>
+        </p:nvSpPr>
+        <p:spPr>
+          <a:xfrm>
+            <a:off x="477013" y="3527956"/>
+            <a:ext cx="5538554" cy="2849985"/>
+          </a:xfrm>
+          <a:prstGeom prst="rect">
+            <a:avLst/>
+          </a:prstGeom>
+          <a:noFill/>
+          <a:ln>
+            <a:solidFill>
+              <a:schemeClr val="tx1"/>
+            </a:solidFill>
+          </a:ln>
+        </p:spPr>
+        <p:style>
+          <a:lnRef idx="2">
+            <a:schemeClr val="accent1">
+              <a:shade val="50000"/>
+            </a:schemeClr>
+          </a:lnRef>
+          <a:fillRef idx="1">
+            <a:schemeClr val="accent1"/>
+          </a:fillRef>
+          <a:effectRef idx="0">
+            <a:schemeClr val="accent1"/>
+          </a:effectRef>
+          <a:fontRef idx="minor">
+            <a:schemeClr val="lt1"/>
+          </a:fontRef>
+        </p:style>
+        <p:txBody>
+          <a:bodyPr rtlCol="0" anchor="ctr"/>
+          <a:lstStyle/>
+          <a:p>
+            <a:pPr algn="ctr"/>
+            <a:endParaRPr lang="en-US"/>
+          </a:p>
+        </p:txBody>
+      </p:sp>
+      <p:pic>
+        <p:nvPicPr>
+          <p:cNvPr id="4" name="Grafik 3">
+            <a:extLst>
+              <a:ext uri="{FF2B5EF4-FFF2-40B4-BE49-F238E27FC236}">
+                <a16:creationId xmlns:a16="http://schemas.microsoft.com/office/drawing/2014/main" id="{C212032A-82E2-467F-A20C-1E073F2DDD7B}"/>
+              </a:ext>
+            </a:extLst>
+          </p:cNvPr>
+          <p:cNvPicPr>
+            <a:picLocks noChangeAspect="1"/>
+          </p:cNvPicPr>
+          <p:nvPr/>
+        </p:nvPicPr>
+        <p:blipFill>
+          <a:blip r:embed="rId4"/>
+          <a:stretch>
+            <a:fillRect/>
+          </a:stretch>
+        </p:blipFill>
+        <p:spPr>
+          <a:xfrm>
+            <a:off x="640249" y="933278"/>
+            <a:ext cx="5212080" cy="1980590"/>
+          </a:xfrm>
+          <a:prstGeom prst="rect">
+            <a:avLst/>
+          </a:prstGeom>
+        </p:spPr>
+      </p:pic>
+      <p:sp>
+        <p:nvSpPr>
+          <p:cNvPr id="20" name="Rectangle 19">
+            <a:extLst>
+              <a:ext uri="{FF2B5EF4-FFF2-40B4-BE49-F238E27FC236}">
+                <a16:creationId xmlns:a16="http://schemas.microsoft.com/office/drawing/2014/main" id="{BB93B4BF-AD35-4E52-8131-161C5FB9CDD7}"/>
+              </a:ext>
+              <a:ext uri="{C183D7F6-B498-43B3-948B-1728B52AA6E4}">
+                <adec:decorative xmlns:adec="http://schemas.microsoft.com/office/drawing/2017/decorative" val="1"/>
+              </a:ext>
+            </a:extLst>
+          </p:cNvPr>
+          <p:cNvSpPr>
+            <a:spLocks noGrp="1" noRot="1" noChangeAspect="1" noMove="1" noResize="1" noEditPoints="1" noAdjustHandles="1" noChangeArrowheads="1" noChangeShapeType="1" noTextEdit="1"/>
+          </p:cNvSpPr>
+          <p:nvPr>
+            <p:extLst>
+              <p:ext uri="{386F3935-93C4-4BCD-93E2-E3B085C9AB24}">
+                <p16:designElem xmlns:p16="http://schemas.microsoft.com/office/powerpoint/2015/main" val="1"/>
+              </p:ext>
+            </p:extLst>
+          </p:nvPr>
+        </p:nvSpPr>
+        <p:spPr>
+          <a:xfrm>
+            <a:off x="6176432" y="3527956"/>
+            <a:ext cx="5538555" cy="2849985"/>
+          </a:xfrm>
+          <a:prstGeom prst="rect">
+            <a:avLst/>
+          </a:prstGeom>
+          <a:noFill/>
+          <a:ln>
+            <a:solidFill>
+              <a:schemeClr val="tx1"/>
+            </a:solidFill>
+          </a:ln>
+        </p:spPr>
+        <p:style>
+          <a:lnRef idx="2">
+            <a:schemeClr val="accent1">
+              <a:shade val="50000"/>
+            </a:schemeClr>
+          </a:lnRef>
+          <a:fillRef idx="1">
+            <a:schemeClr val="accent1"/>
+          </a:fillRef>
+          <a:effectRef idx="0">
+            <a:schemeClr val="accent1"/>
+          </a:effectRef>
+          <a:fontRef idx="minor">
+            <a:schemeClr val="lt1"/>
+          </a:fontRef>
+        </p:style>
+        <p:txBody>
+          <a:bodyPr rtlCol="0" anchor="ctr"/>
+          <a:lstStyle/>
+          <a:p>
+            <a:pPr algn="ctr"/>
+            <a:endParaRPr lang="en-US"/>
+          </a:p>
+        </p:txBody>
+      </p:sp>
+      <p:pic>
+        <p:nvPicPr>
+          <p:cNvPr id="7" name="Grafik 6">
+            <a:extLst>
+              <a:ext uri="{FF2B5EF4-FFF2-40B4-BE49-F238E27FC236}">
+                <a16:creationId xmlns:a16="http://schemas.microsoft.com/office/drawing/2014/main" id="{0584D55F-988B-439E-8F80-7CA8F1D14065}"/>
+              </a:ext>
+            </a:extLst>
+          </p:cNvPr>
+          <p:cNvPicPr>
+            <a:picLocks noChangeAspect="1"/>
+          </p:cNvPicPr>
+          <p:nvPr/>
+        </p:nvPicPr>
+        <p:blipFill>
+          <a:blip r:embed="rId5"/>
+          <a:stretch>
+            <a:fillRect/>
+          </a:stretch>
+        </p:blipFill>
+        <p:spPr>
+          <a:xfrm>
+            <a:off x="6339668" y="3972107"/>
+            <a:ext cx="5212080" cy="1961680"/>
+          </a:xfrm>
+          <a:prstGeom prst="rect">
+            <a:avLst/>
+          </a:prstGeom>
+        </p:spPr>
+      </p:pic>
+    </p:spTree>
+    <p:extLst>
+      <p:ext uri="{BB962C8B-B14F-4D97-AF65-F5344CB8AC3E}">
+        <p14:creationId xmlns:p14="http://schemas.microsoft.com/office/powerpoint/2010/main" val="995088628"/>
+      </p:ext>
+    </p:extLst>
+  </p:cSld>
+  <p:clrMapOvr>
+    <a:overrideClrMapping bg1="dk1" tx1="lt1" bg2="dk2" tx2="lt2" accent1="accent1" accent2="accent2" accent3="accent3" accent4="accent4" accent5="accent5" accent6="accent6" hlink="hlink" folHlink="folHlink"/>
+  </p:clrMapOvr>
 </p:sld>
 </file>
 
@@ -29948,7 +30306,7 @@
             <p:ph idx="1"/>
             <p:extLst>
               <p:ext uri="{D42A27DB-BD31-4B8C-83A1-F6EECF244321}">
-                <p14:modId xmlns:p14="http://schemas.microsoft.com/office/powerpoint/2010/main" val="2170336254"/>
+                <p14:modId xmlns:p14="http://schemas.microsoft.com/office/powerpoint/2010/main" val="1338160250"/>
               </p:ext>
             </p:extLst>
           </p:nvPr>
@@ -29977,104 +30335,6 @@
 </file>
 
 <file path=ppt/slides/slide5.xml><?xml version="1.0" encoding="utf-8"?>
-<p:sld xmlns:a="http://schemas.openxmlformats.org/drawingml/2006/main" xmlns:r="http://schemas.openxmlformats.org/officeDocument/2006/relationships" xmlns:p="http://schemas.openxmlformats.org/presentationml/2006/main">
-  <p:cSld>
-    <p:bg>
-      <p:bgPr>
-        <a:solidFill>
-          <a:schemeClr val="tx1"/>
-        </a:solidFill>
-        <a:effectLst/>
-      </p:bgPr>
-    </p:bg>
-    <p:spTree>
-      <p:nvGrpSpPr>
-        <p:cNvPr id="1" name=""/>
-        <p:cNvGrpSpPr/>
-        <p:nvPr/>
-      </p:nvGrpSpPr>
-      <p:grpSpPr>
-        <a:xfrm>
-          <a:off x="0" y="0"/>
-          <a:ext cx="0" cy="0"/>
-          <a:chOff x="0" y="0"/>
-          <a:chExt cx="0" cy="0"/>
-        </a:xfrm>
-      </p:grpSpPr>
-      <p:pic>
-        <p:nvPicPr>
-          <p:cNvPr id="8" name="Grafik 7">
-            <a:extLst>
-              <a:ext uri="{FF2B5EF4-FFF2-40B4-BE49-F238E27FC236}">
-                <a16:creationId xmlns:a16="http://schemas.microsoft.com/office/drawing/2014/main" id="{EDDACB89-ACF6-426A-AC64-E75889BDFB58}"/>
-              </a:ext>
-            </a:extLst>
-          </p:cNvPr>
-          <p:cNvPicPr>
-            <a:picLocks noChangeAspect="1"/>
-          </p:cNvPicPr>
-          <p:nvPr/>
-        </p:nvPicPr>
-        <p:blipFill>
-          <a:blip r:embed="rId2"/>
-          <a:stretch>
-            <a:fillRect/>
-          </a:stretch>
-        </p:blipFill>
-        <p:spPr>
-          <a:xfrm>
-            <a:off x="3064878" y="90349"/>
-            <a:ext cx="6359341" cy="3338651"/>
-          </a:xfrm>
-          <a:prstGeom prst="rect">
-            <a:avLst/>
-          </a:prstGeom>
-        </p:spPr>
-      </p:pic>
-      <p:pic>
-        <p:nvPicPr>
-          <p:cNvPr id="2" name="Grafik 1">
-            <a:extLst>
-              <a:ext uri="{FF2B5EF4-FFF2-40B4-BE49-F238E27FC236}">
-                <a16:creationId xmlns:a16="http://schemas.microsoft.com/office/drawing/2014/main" id="{BCD64FB6-228F-49CB-8290-92F3773CD804}"/>
-              </a:ext>
-            </a:extLst>
-          </p:cNvPr>
-          <p:cNvPicPr>
-            <a:picLocks noChangeAspect="1"/>
-          </p:cNvPicPr>
-          <p:nvPr/>
-        </p:nvPicPr>
-        <p:blipFill>
-          <a:blip r:embed="rId3"/>
-          <a:stretch>
-            <a:fillRect/>
-          </a:stretch>
-        </p:blipFill>
-        <p:spPr>
-          <a:xfrm>
-            <a:off x="3064878" y="3429000"/>
-            <a:ext cx="6359341" cy="3322431"/>
-          </a:xfrm>
-          <a:prstGeom prst="rect">
-            <a:avLst/>
-          </a:prstGeom>
-        </p:spPr>
-      </p:pic>
-    </p:spTree>
-    <p:extLst>
-      <p:ext uri="{BB962C8B-B14F-4D97-AF65-F5344CB8AC3E}">
-        <p14:creationId xmlns:p14="http://schemas.microsoft.com/office/powerpoint/2010/main" val="1120697390"/>
-      </p:ext>
-    </p:extLst>
-  </p:cSld>
-  <p:clrMapOvr>
-    <a:masterClrMapping/>
-  </p:clrMapOvr>
-</p:sld>
-</file>
-
-<file path=ppt/slides/slide6.xml><?xml version="1.0" encoding="utf-8"?>
 <p:sld xmlns:a="http://schemas.openxmlformats.org/drawingml/2006/main" xmlns:r="http://schemas.openxmlformats.org/officeDocument/2006/relationships" xmlns:p="http://schemas.openxmlformats.org/presentationml/2006/main">
   <p:cSld>
     <p:bg>
@@ -30161,10 +30421,10 @@
       </p:sp>
       <p:pic>
         <p:nvPicPr>
-          <p:cNvPr id="4" name="Grafik 3">
+          <p:cNvPr id="2" name="Grafik 1">
             <a:extLst>
               <a:ext uri="{FF2B5EF4-FFF2-40B4-BE49-F238E27FC236}">
-                <a16:creationId xmlns:a16="http://schemas.microsoft.com/office/drawing/2014/main" id="{668972C0-9343-48DA-8912-E11AF6EE87F1}"/>
+                <a16:creationId xmlns:a16="http://schemas.microsoft.com/office/drawing/2014/main" id="{E78B7854-6D4B-42C0-80F2-4D691AA5BD45}"/>
               </a:ext>
             </a:extLst>
           </p:cNvPr>
@@ -30181,8 +30441,8 @@
         </p:blipFill>
         <p:spPr>
           <a:xfrm>
-            <a:off x="3364543" y="59067"/>
-            <a:ext cx="5884831" cy="3148382"/>
+            <a:off x="2865793" y="82485"/>
+            <a:ext cx="6368410" cy="3335013"/>
           </a:xfrm>
           <a:prstGeom prst="rect">
             <a:avLst/>
@@ -30191,10 +30451,10 @@
       </p:pic>
       <p:pic>
         <p:nvPicPr>
-          <p:cNvPr id="5" name="Grafik 4">
+          <p:cNvPr id="3" name="Grafik 2">
             <a:extLst>
               <a:ext uri="{FF2B5EF4-FFF2-40B4-BE49-F238E27FC236}">
-                <a16:creationId xmlns:a16="http://schemas.microsoft.com/office/drawing/2014/main" id="{2FE1595E-538C-42F6-AFFA-81589780F40D}"/>
+                <a16:creationId xmlns:a16="http://schemas.microsoft.com/office/drawing/2014/main" id="{F3506981-C886-4058-B8B9-8BBAE7C481F1}"/>
               </a:ext>
             </a:extLst>
           </p:cNvPr>
@@ -30211,8 +30471,8 @@
         </p:blipFill>
         <p:spPr>
           <a:xfrm>
-            <a:off x="3364543" y="3207448"/>
-            <a:ext cx="5884831" cy="3118958"/>
+            <a:off x="2865793" y="3429000"/>
+            <a:ext cx="6368410" cy="3308445"/>
           </a:xfrm>
           <a:prstGeom prst="rect">
             <a:avLst/>
@@ -30232,7 +30492,7 @@
 </p:sld>
 </file>
 
-<file path=ppt/slides/slide7.xml><?xml version="1.0" encoding="utf-8"?>
+<file path=ppt/slides/slide6.xml><?xml version="1.0" encoding="utf-8"?>
 <p:sld xmlns:a="http://schemas.openxmlformats.org/drawingml/2006/main" xmlns:r="http://schemas.openxmlformats.org/officeDocument/2006/relationships" xmlns:p="http://schemas.openxmlformats.org/presentationml/2006/main">
   <p:cSld>
     <p:spTree>
@@ -30459,7 +30719,7 @@
 </p:sld>
 </file>
 
-<file path=ppt/slides/slide8.xml><?xml version="1.0" encoding="utf-8"?>
+<file path=ppt/slides/slide7.xml><?xml version="1.0" encoding="utf-8"?>
 <p:sld xmlns:a="http://schemas.openxmlformats.org/drawingml/2006/main" xmlns:r="http://schemas.openxmlformats.org/officeDocument/2006/relationships" xmlns:p="http://schemas.openxmlformats.org/presentationml/2006/main">
   <p:cSld>
     <p:spTree>
@@ -30737,7 +30997,7 @@
 </p:sld>
 </file>
 
-<file path=ppt/slides/slide9.xml><?xml version="1.0" encoding="utf-8"?>
+<file path=ppt/slides/slide8.xml><?xml version="1.0" encoding="utf-8"?>
 <p:sld xmlns:a="http://schemas.openxmlformats.org/drawingml/2006/main" xmlns:r="http://schemas.openxmlformats.org/officeDocument/2006/relationships" xmlns:p="http://schemas.openxmlformats.org/presentationml/2006/main">
   <p:cSld>
     <p:spTree>
@@ -31014,6 +31274,95 @@
       </p:par>
     </p:tnLst>
   </p:timing>
+</p:sld>
+</file>
+
+<file path=ppt/slides/slide9.xml><?xml version="1.0" encoding="utf-8"?>
+<p:sld xmlns:a="http://schemas.openxmlformats.org/drawingml/2006/main" xmlns:r="http://schemas.openxmlformats.org/officeDocument/2006/relationships" xmlns:p="http://schemas.openxmlformats.org/presentationml/2006/main">
+  <p:cSld>
+    <p:spTree>
+      <p:nvGrpSpPr>
+        <p:cNvPr id="1" name=""/>
+        <p:cNvGrpSpPr/>
+        <p:nvPr/>
+      </p:nvGrpSpPr>
+      <p:grpSpPr>
+        <a:xfrm>
+          <a:off x="0" y="0"/>
+          <a:ext cx="0" cy="0"/>
+          <a:chOff x="0" y="0"/>
+          <a:chExt cx="0" cy="0"/>
+        </a:xfrm>
+      </p:grpSpPr>
+      <p:sp>
+        <p:nvSpPr>
+          <p:cNvPr id="2" name="Titel 1">
+            <a:extLst>
+              <a:ext uri="{FF2B5EF4-FFF2-40B4-BE49-F238E27FC236}">
+                <a16:creationId xmlns:a16="http://schemas.microsoft.com/office/drawing/2014/main" id="{568F2C59-1472-497B-9097-00D0F5DCA36F}"/>
+              </a:ext>
+            </a:extLst>
+          </p:cNvPr>
+          <p:cNvSpPr>
+            <a:spLocks noGrp="1"/>
+          </p:cNvSpPr>
+          <p:nvPr>
+            <p:ph type="title"/>
+          </p:nvPr>
+        </p:nvSpPr>
+        <p:spPr/>
+        <p:txBody>
+          <a:bodyPr/>
+          <a:lstStyle/>
+          <a:p>
+            <a:r>
+              <a:rPr lang="de-DE" dirty="0"/>
+              <a:t>Progress and </a:t>
+            </a:r>
+            <a:r>
+              <a:rPr lang="de-DE" dirty="0" err="1"/>
+              <a:t>results</a:t>
+            </a:r>
+            <a:endParaRPr lang="en-DE" dirty="0"/>
+          </a:p>
+        </p:txBody>
+      </p:sp>
+      <p:graphicFrame>
+        <p:nvGraphicFramePr>
+          <p:cNvPr id="9" name="Inhaltsplatzhalter 8">
+            <a:extLst>
+              <a:ext uri="{FF2B5EF4-FFF2-40B4-BE49-F238E27FC236}">
+                <a16:creationId xmlns:a16="http://schemas.microsoft.com/office/drawing/2014/main" id="{16C41FA3-7AAB-4273-8481-B68DB56A597A}"/>
+              </a:ext>
+            </a:extLst>
+          </p:cNvPr>
+          <p:cNvGraphicFramePr>
+            <a:graphicFrameLocks noGrp="1"/>
+          </p:cNvGraphicFramePr>
+          <p:nvPr>
+            <p:ph idx="1"/>
+          </p:nvPr>
+        </p:nvGraphicFramePr>
+        <p:xfrm>
+          <a:off x="1371600" y="2286000"/>
+          <a:ext cx="9601200" cy="3581400"/>
+        </p:xfrm>
+        <a:graphic>
+          <a:graphicData uri="http://schemas.openxmlformats.org/drawingml/2006/diagram">
+            <dgm:relIds xmlns:dgm="http://schemas.openxmlformats.org/drawingml/2006/diagram" xmlns:r="http://schemas.openxmlformats.org/officeDocument/2006/relationships" r:dm="rId2" r:lo="rId3" r:qs="rId4" r:cs="rId5"/>
+          </a:graphicData>
+        </a:graphic>
+      </p:graphicFrame>
+    </p:spTree>
+    <p:extLst>
+      <p:ext uri="{BB962C8B-B14F-4D97-AF65-F5344CB8AC3E}">
+        <p14:creationId xmlns:p14="http://schemas.microsoft.com/office/powerpoint/2010/main" val="3695933313"/>
+      </p:ext>
+    </p:extLst>
+  </p:cSld>
+  <p:clrMapOvr>
+    <a:masterClrMapping/>
+  </p:clrMapOvr>
 </p:sld>
 </file>
 

</xml_diff>